<commit_message>
ajoutés : 2 IPs pour matrix_block et corrigé Pearson
</commit_message>
<xml_diff>
--- a/presentation_finale/prensent_A2_ghaoui.pptx
+++ b/presentation_finale/prensent_A2_ghaoui.pptx
@@ -5383,7 +5383,7 @@
         <p:spPr>
           <a:xfrm>
             <a:off x="360" y="2362680"/>
-            <a:ext cx="9717840" cy="943920"/>
+            <a:ext cx="9717480" cy="943560"/>
           </a:xfrm>
           <a:prstGeom prst="rect">
             <a:avLst/>
@@ -5669,7 +5669,7 @@
         <p:spPr>
           <a:xfrm>
             <a:off x="360" y="135000"/>
-            <a:ext cx="9717840" cy="943920"/>
+            <a:ext cx="9717480" cy="943560"/>
           </a:xfrm>
           <a:prstGeom prst="rect">
             <a:avLst/>
@@ -5697,7 +5697,7 @@
         <p:spPr>
           <a:xfrm>
             <a:off x="7559280" y="5130000"/>
-            <a:ext cx="2518560" cy="403920"/>
+            <a:ext cx="2518200" cy="403560"/>
           </a:xfrm>
           <a:prstGeom prst="rect">
             <a:avLst/>
@@ -5725,7 +5725,7 @@
         <p:spPr>
           <a:xfrm>
             <a:off x="899640" y="5130000"/>
-            <a:ext cx="6478200" cy="403920"/>
+            <a:ext cx="6477840" cy="403560"/>
           </a:xfrm>
           <a:prstGeom prst="rect">
             <a:avLst/>
@@ -5753,7 +5753,7 @@
         <p:spPr>
           <a:xfrm>
             <a:off x="179640" y="5130000"/>
-            <a:ext cx="538560" cy="403920"/>
+            <a:ext cx="538200" cy="403560"/>
           </a:xfrm>
           <a:prstGeom prst="rect">
             <a:avLst/>
@@ -6037,7 +6037,7 @@
         <p:spPr>
           <a:xfrm>
             <a:off x="360" y="135000"/>
-            <a:ext cx="9717840" cy="943920"/>
+            <a:ext cx="9717480" cy="943560"/>
           </a:xfrm>
           <a:prstGeom prst="rect">
             <a:avLst/>
@@ -6065,7 +6065,7 @@
         <p:spPr>
           <a:xfrm>
             <a:off x="7559280" y="5130000"/>
-            <a:ext cx="2518560" cy="403920"/>
+            <a:ext cx="2518200" cy="403560"/>
           </a:xfrm>
           <a:prstGeom prst="rect">
             <a:avLst/>
@@ -6093,7 +6093,7 @@
         <p:spPr>
           <a:xfrm>
             <a:off x="899640" y="5130000"/>
-            <a:ext cx="6478200" cy="403920"/>
+            <a:ext cx="6477840" cy="403560"/>
           </a:xfrm>
           <a:prstGeom prst="rect">
             <a:avLst/>
@@ -6121,7 +6121,7 @@
         <p:spPr>
           <a:xfrm>
             <a:off x="179640" y="5130000"/>
-            <a:ext cx="538560" cy="403920"/>
+            <a:ext cx="538200" cy="403560"/>
           </a:xfrm>
           <a:prstGeom prst="rect">
             <a:avLst/>
@@ -6165,7 +6165,19 @@
               <a:rPr b="0" lang="en-US" sz="4400" spc="-1" strike="noStrike">
                 <a:latin typeface="Arial"/>
               </a:rPr>
-              <a:t>Click to edit the title text format</a:t>
+              <a:t>Click to edit </a:t>
+            </a:r>
+            <a:r>
+              <a:rPr b="0" lang="en-US" sz="4400" spc="-1" strike="noStrike">
+                <a:latin typeface="Arial"/>
+              </a:rPr>
+              <a:t>the title text </a:t>
+            </a:r>
+            <a:r>
+              <a:rPr b="0" lang="en-US" sz="4400" spc="-1" strike="noStrike">
+                <a:latin typeface="Arial"/>
+              </a:rPr>
+              <a:t>format</a:t>
             </a:r>
             <a:endParaRPr b="0" lang="en-US" sz="4400" spc="-1" strike="noStrike">
               <a:latin typeface="Arial"/>
@@ -6405,7 +6417,7 @@
         <p:spPr>
           <a:xfrm>
             <a:off x="360" y="135000"/>
-            <a:ext cx="9717840" cy="943920"/>
+            <a:ext cx="9717480" cy="943560"/>
           </a:xfrm>
           <a:prstGeom prst="rect">
             <a:avLst/>
@@ -6433,7 +6445,7 @@
         <p:spPr>
           <a:xfrm>
             <a:off x="7559280" y="5130000"/>
-            <a:ext cx="2518560" cy="403920"/>
+            <a:ext cx="2518200" cy="403560"/>
           </a:xfrm>
           <a:prstGeom prst="rect">
             <a:avLst/>
@@ -6461,7 +6473,7 @@
         <p:spPr>
           <a:xfrm>
             <a:off x="899640" y="5130000"/>
-            <a:ext cx="6478200" cy="403920"/>
+            <a:ext cx="6477840" cy="403560"/>
           </a:xfrm>
           <a:prstGeom prst="rect">
             <a:avLst/>
@@ -6489,7 +6501,7 @@
         <p:spPr>
           <a:xfrm>
             <a:off x="179640" y="5130000"/>
-            <a:ext cx="538560" cy="403920"/>
+            <a:ext cx="538200" cy="403560"/>
           </a:xfrm>
           <a:prstGeom prst="rect">
             <a:avLst/>
@@ -6518,8 +6530,8 @@
         </p:nvSpPr>
         <p:spPr>
           <a:xfrm>
-            <a:off x="503640" y="225720"/>
-            <a:ext cx="9070920" cy="946080"/>
+            <a:off x="504000" y="226080"/>
+            <a:ext cx="9071640" cy="946080"/>
           </a:xfrm>
           <a:prstGeom prst="rect">
             <a:avLst/>
@@ -6552,8 +6564,8 @@
         </p:nvSpPr>
         <p:spPr>
           <a:xfrm>
-            <a:off x="503640" y="1326240"/>
-            <a:ext cx="4426200" cy="3287880"/>
+            <a:off x="504000" y="1326600"/>
+            <a:ext cx="4426560" cy="3288240"/>
           </a:xfrm>
           <a:prstGeom prst="rect">
             <a:avLst/>
@@ -6731,8 +6743,8 @@
         </p:nvSpPr>
         <p:spPr>
           <a:xfrm>
-            <a:off x="5151960" y="1326240"/>
-            <a:ext cx="4426200" cy="3287880"/>
+            <a:off x="5152680" y="1326600"/>
+            <a:ext cx="4426560" cy="3288240"/>
           </a:xfrm>
           <a:prstGeom prst="rect">
             <a:avLst/>
@@ -6951,7 +6963,7 @@
         <p:spPr>
           <a:xfrm>
             <a:off x="359640" y="2497680"/>
-            <a:ext cx="9357840" cy="673920"/>
+            <a:ext cx="9357480" cy="673560"/>
           </a:xfrm>
           <a:prstGeom prst="rect">
             <a:avLst/>
@@ -6967,29 +6979,6 @@
           <a:effectRef idx="0"/>
           <a:fontRef idx="minor"/>
         </p:style>
-        <p:txBody>
-          <a:bodyPr lIns="0" rIns="0" tIns="0" bIns="0" anchor="b"/>
-          <a:p>
-            <a:pPr>
-              <a:lnSpc>
-                <a:spcPct val="100000"/>
-              </a:lnSpc>
-            </a:pPr>
-            <a:r>
-              <a:rPr b="1" lang="en-US" sz="3200" spc="-1" strike="noStrike">
-                <a:solidFill>
-                  <a:srgbClr val="ffffff"/>
-                </a:solidFill>
-                <a:latin typeface="Noto Sans Black"/>
-                <a:ea typeface="DejaVu Sans"/>
-              </a:rPr>
-              <a:t>Présentation de l’avancement du projet</a:t>
-            </a:r>
-            <a:endParaRPr b="0" lang="en-US" sz="3200" spc="-1" strike="noStrike">
-              <a:latin typeface="Arial"/>
-            </a:endParaRPr>
-          </a:p>
-        </p:txBody>
       </p:sp>
       <p:sp>
         <p:nvSpPr>
@@ -7000,7 +6989,7 @@
         <p:spPr>
           <a:xfrm>
             <a:off x="539640" y="3537000"/>
-            <a:ext cx="3634200" cy="1348920"/>
+            <a:ext cx="3633840" cy="1348560"/>
           </a:xfrm>
           <a:prstGeom prst="rect">
             <a:avLst/>
@@ -7129,7 +7118,7 @@
         <p:spPr>
           <a:xfrm>
             <a:off x="2087640" y="216000"/>
-            <a:ext cx="5902200" cy="378720"/>
+            <a:ext cx="5901840" cy="378360"/>
           </a:xfrm>
           <a:prstGeom prst="rect">
             <a:avLst/>
@@ -7161,7 +7150,7 @@
                 <a:latin typeface="Noto Sans"/>
                 <a:ea typeface="DejaVu Sans"/>
               </a:rPr>
-              <a:t>Université Paris-Saclay</a:t>
+              <a:t>Paris-Saclay University</a:t>
             </a:r>
             <a:endParaRPr b="0" lang="en-US" sz="2400" spc="-1" strike="noStrike">
               <a:latin typeface="Arial"/>
@@ -7178,7 +7167,7 @@
         <p:spPr>
           <a:xfrm>
             <a:off x="6047280" y="3537000"/>
-            <a:ext cx="3166200" cy="638640"/>
+            <a:ext cx="3165840" cy="638280"/>
           </a:xfrm>
           <a:prstGeom prst="rect">
             <a:avLst/>
@@ -7210,7 +7199,17 @@
                 <a:latin typeface="Noto Sans"/>
                 <a:ea typeface="DejaVu Sans"/>
               </a:rPr>
-              <a:t>Le : 28 Janvier 2020</a:t>
+              <a:t> </a:t>
+            </a:r>
+            <a:r>
+              <a:rPr b="0" lang="en-US" sz="2200" spc="-1" strike="noStrike">
+                <a:solidFill>
+                  <a:srgbClr val="000000"/>
+                </a:solidFill>
+                <a:latin typeface="Noto Sans"/>
+                <a:ea typeface="DejaVu Sans"/>
+              </a:rPr>
+              <a:t>2020 February 03</a:t>
             </a:r>
             <a:endParaRPr b="0" lang="en-US" sz="2200" spc="-1" strike="noStrike">
               <a:latin typeface="Arial"/>
@@ -7227,7 +7226,7 @@
         <p:spPr>
           <a:xfrm>
             <a:off x="881640" y="942840"/>
-            <a:ext cx="8313840" cy="837720"/>
+            <a:ext cx="8313480" cy="837360"/>
           </a:xfrm>
           <a:prstGeom prst="rect">
             <a:avLst/>
@@ -7259,9 +7258,56 @@
                 <a:latin typeface="Noto Sans"/>
                 <a:ea typeface="DejaVu Sans"/>
               </a:rPr>
-              <a:t>A2 : Systèmes électroniques embarqués</a:t>
+              <a:t>A2 : Embedded  Electronic Systems</a:t>
             </a:r>
             <a:endParaRPr b="0" lang="en-US" sz="2800" spc="-1" strike="noStrike">
+              <a:latin typeface="Arial"/>
+            </a:endParaRPr>
+          </a:p>
+        </p:txBody>
+      </p:sp>
+      <p:sp>
+        <p:nvSpPr>
+          <p:cNvPr id="171" name="TextShape 6"/>
+          <p:cNvSpPr txBox="1"/>
+          <p:nvPr/>
+        </p:nvSpPr>
+        <p:spPr>
+          <a:xfrm>
+            <a:off x="182880" y="2378160"/>
+            <a:ext cx="9509760" cy="914400"/>
+          </a:xfrm>
+          <a:prstGeom prst="rect">
+            <a:avLst/>
+          </a:prstGeom>
+          <a:noFill/>
+          <a:ln>
+            <a:noFill/>
+          </a:ln>
+        </p:spPr>
+        <p:txBody>
+          <a:bodyPr lIns="90000" rIns="90000" tIns="45000" bIns="45000"/>
+          <a:p>
+            <a:pPr algn="ctr"/>
+            <a:r>
+              <a:rPr b="1" lang="en-US" sz="2600" spc="-1" strike="noStrike">
+                <a:latin typeface="Arial"/>
+              </a:rPr>
+              <a:t>Heterogeneous architecture for Big Data algorithms </a:t>
+            </a:r>
+            <a:endParaRPr b="1" lang="en-US" sz="2600" spc="-1" strike="noStrike">
+              <a:latin typeface="Arial"/>
+            </a:endParaRPr>
+          </a:p>
+          <a:p>
+            <a:pPr algn="ctr"/>
+            <a:r>
+              <a:rPr b="1" lang="en-US" sz="2600" spc="-1" strike="noStrike">
+                <a:latin typeface="Arial"/>
+              </a:rPr>
+              <a:t>Final presentation</a:t>
+            </a:r>
+            <a:endParaRPr b="1" lang="en-US" sz="2600" spc="-1" strike="noStrike">
               <a:latin typeface="Arial"/>
             </a:endParaRPr>
           </a:p>
@@ -7318,14 +7364,14 @@
       </p:grpSpPr>
       <p:sp>
         <p:nvSpPr>
-          <p:cNvPr id="171" name="CustomShape 1"/>
+          <p:cNvPr id="172" name="CustomShape 1"/>
           <p:cNvSpPr/>
           <p:nvPr/>
         </p:nvSpPr>
         <p:spPr>
           <a:xfrm>
             <a:off x="359640" y="270000"/>
-            <a:ext cx="9357840" cy="673920"/>
+            <a:ext cx="9357480" cy="673560"/>
           </a:xfrm>
           <a:prstGeom prst="rect">
             <a:avLst/>
@@ -7350,16 +7396,6 @@
               </a:lnSpc>
             </a:pPr>
             <a:r>
-              <a:rPr b="1" lang="en-US" sz="3600" spc="-1" strike="noStrike">
-                <a:solidFill>
-                  <a:srgbClr val="ffffff"/>
-                </a:solidFill>
-                <a:latin typeface="Noto Sans Black"/>
-                <a:ea typeface="DejaVu Sans"/>
-              </a:rPr>
-              <a:t>Équipe</a:t>
-            </a:r>
-            <a:r>
               <a:rPr b="1" lang="en-US" sz="3200" spc="-1" strike="noStrike">
                 <a:solidFill>
                   <a:srgbClr val="ffffff"/>
@@ -7367,6 +7403,16 @@
                 <a:latin typeface="Noto Sans Black"/>
                 <a:ea typeface="DejaVu Sans"/>
               </a:rPr>
+              <a:t>TEAM</a:t>
+            </a:r>
+            <a:r>
+              <a:rPr b="1" lang="en-US" sz="3200" spc="-1" strike="noStrike">
+                <a:solidFill>
+                  <a:srgbClr val="ffffff"/>
+                </a:solidFill>
+                <a:latin typeface="Noto Sans Black"/>
+                <a:ea typeface="DejaVu Sans"/>
+              </a:rPr>
               <a:t> </a:t>
             </a:r>
             <a:endParaRPr b="0" lang="en-US" sz="3200" spc="-1" strike="noStrike">
@@ -7377,14 +7423,14 @@
       </p:sp>
       <p:sp>
         <p:nvSpPr>
-          <p:cNvPr id="172" name="CustomShape 2"/>
+          <p:cNvPr id="173" name="CustomShape 2"/>
           <p:cNvSpPr/>
           <p:nvPr/>
         </p:nvSpPr>
         <p:spPr>
           <a:xfrm>
             <a:off x="359640" y="1485000"/>
-            <a:ext cx="9177840" cy="3508920"/>
+            <a:ext cx="9177480" cy="3508560"/>
           </a:xfrm>
           <a:prstGeom prst="rect">
             <a:avLst/>
@@ -7405,7 +7451,7 @@
             <a:normAutofit/>
           </a:bodyPr>
           <a:p>
-            <a:pPr marL="216000" indent="-214560">
+            <a:pPr marL="216000" indent="-214200">
               <a:lnSpc>
                 <a:spcPct val="100000"/>
               </a:lnSpc>
@@ -7434,7 +7480,7 @@
             </a:endParaRPr>
           </a:p>
           <a:p>
-            <a:pPr lvl="2" marL="648000" indent="-215280">
+            <a:pPr lvl="2" marL="648000" indent="-214920">
               <a:lnSpc>
                 <a:spcPct val="100000"/>
               </a:lnSpc>
@@ -7463,7 +7509,7 @@
             </a:endParaRPr>
           </a:p>
           <a:p>
-            <a:pPr lvl="2" marL="648000" indent="-215280">
+            <a:pPr lvl="2" marL="648000" indent="-214920">
               <a:lnSpc>
                 <a:spcPct val="100000"/>
               </a:lnSpc>
@@ -7492,7 +7538,7 @@
             </a:endParaRPr>
           </a:p>
           <a:p>
-            <a:pPr marL="216000" indent="-214560">
+            <a:pPr marL="216000" indent="-214200">
               <a:lnSpc>
                 <a:spcPct val="100000"/>
               </a:lnSpc>
@@ -7521,7 +7567,7 @@
             </a:endParaRPr>
           </a:p>
           <a:p>
-            <a:pPr lvl="2" marL="648000" indent="-215280">
+            <a:pPr lvl="2" marL="648000" indent="-214920">
               <a:lnSpc>
                 <a:spcPct val="100000"/>
               </a:lnSpc>
@@ -7550,7 +7596,7 @@
             </a:endParaRPr>
           </a:p>
           <a:p>
-            <a:pPr marL="216000" indent="-214560">
+            <a:pPr marL="216000" indent="-214200">
               <a:lnSpc>
                 <a:spcPct val="100000"/>
               </a:lnSpc>
@@ -7579,7 +7625,7 @@
             </a:endParaRPr>
           </a:p>
           <a:p>
-            <a:pPr lvl="2" marL="648000" indent="-215280">
+            <a:pPr lvl="2" marL="648000" indent="-214920">
               <a:lnSpc>
                 <a:spcPct val="100000"/>
               </a:lnSpc>
@@ -7660,14 +7706,14 @@
       </p:grpSpPr>
       <p:sp>
         <p:nvSpPr>
-          <p:cNvPr id="173" name="CustomShape 1"/>
+          <p:cNvPr id="174" name="CustomShape 1"/>
           <p:cNvSpPr/>
           <p:nvPr/>
         </p:nvSpPr>
         <p:spPr>
           <a:xfrm>
             <a:off x="359640" y="270000"/>
-            <a:ext cx="9357840" cy="673920"/>
+            <a:ext cx="9357480" cy="673560"/>
           </a:xfrm>
           <a:prstGeom prst="rect">
             <a:avLst/>
@@ -7709,14 +7755,14 @@
       </p:sp>
       <p:sp>
         <p:nvSpPr>
-          <p:cNvPr id="174" name="CustomShape 2"/>
+          <p:cNvPr id="175" name="CustomShape 2"/>
           <p:cNvSpPr/>
           <p:nvPr/>
         </p:nvSpPr>
         <p:spPr>
           <a:xfrm>
             <a:off x="359640" y="1485000"/>
-            <a:ext cx="9177840" cy="3508920"/>
+            <a:ext cx="9177480" cy="3508560"/>
           </a:xfrm>
           <a:prstGeom prst="rect">
             <a:avLst/>
@@ -8004,7 +8050,7 @@
       </p:sp>
       <p:pic>
         <p:nvPicPr>
-          <p:cNvPr id="175" name="" descr=""/>
+          <p:cNvPr id="176" name="" descr=""/>
           <p:cNvPicPr/>
           <p:nvPr/>
         </p:nvPicPr>
@@ -8015,7 +8061,7 @@
         <p:spPr>
           <a:xfrm>
             <a:off x="5507280" y="2753280"/>
-            <a:ext cx="2123280" cy="797040"/>
+            <a:ext cx="2122920" cy="796680"/>
           </a:xfrm>
           <a:prstGeom prst="rect">
             <a:avLst/>
@@ -8027,7 +8073,7 @@
       </p:pic>
       <p:pic>
         <p:nvPicPr>
-          <p:cNvPr id="176" name="" descr=""/>
+          <p:cNvPr id="177" name="" descr=""/>
           <p:cNvPicPr/>
           <p:nvPr/>
         </p:nvPicPr>
@@ -8038,7 +8084,7 @@
         <p:spPr>
           <a:xfrm>
             <a:off x="3383640" y="3618000"/>
-            <a:ext cx="1774800" cy="520920"/>
+            <a:ext cx="1774440" cy="520560"/>
           </a:xfrm>
           <a:prstGeom prst="rect">
             <a:avLst/>
@@ -8099,14 +8145,14 @@
       </p:grpSpPr>
       <p:sp>
         <p:nvSpPr>
-          <p:cNvPr id="177" name="CustomShape 1"/>
+          <p:cNvPr id="178" name="CustomShape 1"/>
           <p:cNvSpPr/>
           <p:nvPr/>
         </p:nvSpPr>
         <p:spPr>
           <a:xfrm>
             <a:off x="359640" y="270000"/>
-            <a:ext cx="9357840" cy="673920"/>
+            <a:ext cx="9357480" cy="673560"/>
           </a:xfrm>
           <a:prstGeom prst="rect">
             <a:avLst/>
@@ -8148,14 +8194,14 @@
       </p:sp>
       <p:sp>
         <p:nvSpPr>
-          <p:cNvPr id="178" name="CustomShape 2"/>
+          <p:cNvPr id="179" name="CustomShape 2"/>
           <p:cNvSpPr/>
           <p:nvPr/>
         </p:nvSpPr>
         <p:spPr>
           <a:xfrm>
             <a:off x="359640" y="1341000"/>
-            <a:ext cx="9177840" cy="3508920"/>
+            <a:ext cx="9177480" cy="3508560"/>
           </a:xfrm>
           <a:prstGeom prst="rect">
             <a:avLst/>
@@ -8340,7 +8386,7 @@
       </p:sp>
       <p:pic>
         <p:nvPicPr>
-          <p:cNvPr id="179" name="图片 3" descr=""/>
+          <p:cNvPr id="180" name="图片 3" descr=""/>
           <p:cNvPicPr/>
           <p:nvPr/>
         </p:nvPicPr>
@@ -8351,7 +8397,7 @@
         <p:spPr>
           <a:xfrm>
             <a:off x="1455120" y="2195640"/>
-            <a:ext cx="2306880" cy="1003680"/>
+            <a:ext cx="2306520" cy="1003320"/>
           </a:xfrm>
           <a:prstGeom prst="rect">
             <a:avLst/>
@@ -8363,7 +8409,7 @@
       </p:pic>
       <p:pic>
         <p:nvPicPr>
-          <p:cNvPr id="180" name="图片 4" descr=""/>
+          <p:cNvPr id="181" name="图片 4" descr=""/>
           <p:cNvPicPr/>
           <p:nvPr/>
         </p:nvPicPr>
@@ -8374,7 +8420,7 @@
         <p:spPr>
           <a:xfrm>
             <a:off x="5979600" y="2259720"/>
-            <a:ext cx="1770120" cy="875160"/>
+            <a:ext cx="1769760" cy="874800"/>
           </a:xfrm>
           <a:prstGeom prst="rect">
             <a:avLst/>
@@ -8386,7 +8432,7 @@
       </p:pic>
       <p:pic>
         <p:nvPicPr>
-          <p:cNvPr id="181" name="图片 6" descr=""/>
+          <p:cNvPr id="182" name="图片 6" descr=""/>
           <p:cNvPicPr/>
           <p:nvPr/>
         </p:nvPicPr>
@@ -8397,7 +8443,7 @@
         <p:spPr>
           <a:xfrm>
             <a:off x="1455120" y="3769920"/>
-            <a:ext cx="1751040" cy="1037160"/>
+            <a:ext cx="1750680" cy="1036800"/>
           </a:xfrm>
           <a:prstGeom prst="rect">
             <a:avLst/>
@@ -8409,7 +8455,7 @@
       </p:pic>
       <p:pic>
         <p:nvPicPr>
-          <p:cNvPr id="182" name="图片 7" descr=""/>
+          <p:cNvPr id="183" name="图片 7" descr=""/>
           <p:cNvPicPr/>
           <p:nvPr/>
         </p:nvPicPr>
@@ -8420,7 +8466,7 @@
         <p:spPr>
           <a:xfrm>
             <a:off x="5979600" y="3789360"/>
-            <a:ext cx="1922760" cy="1018080"/>
+            <a:ext cx="1922400" cy="1017720"/>
           </a:xfrm>
           <a:prstGeom prst="rect">
             <a:avLst/>
@@ -8481,14 +8527,14 @@
       </p:grpSpPr>
       <p:sp>
         <p:nvSpPr>
-          <p:cNvPr id="183" name="CustomShape 1"/>
+          <p:cNvPr id="184" name="CustomShape 1"/>
           <p:cNvSpPr/>
           <p:nvPr/>
         </p:nvSpPr>
         <p:spPr>
           <a:xfrm>
             <a:off x="359640" y="270000"/>
-            <a:ext cx="9357840" cy="673920"/>
+            <a:ext cx="9357480" cy="673560"/>
           </a:xfrm>
           <a:prstGeom prst="rect">
             <a:avLst/>
@@ -8530,7 +8576,7 @@
       </p:sp>
       <p:pic>
         <p:nvPicPr>
-          <p:cNvPr id="184" name="Image 4" descr=""/>
+          <p:cNvPr id="185" name="Image 4" descr=""/>
           <p:cNvPicPr/>
           <p:nvPr/>
         </p:nvPicPr>
@@ -8541,7 +8587,7 @@
         <p:spPr>
           <a:xfrm>
             <a:off x="1515960" y="1656000"/>
-            <a:ext cx="8707680" cy="3035160"/>
+            <a:ext cx="8707320" cy="3034800"/>
           </a:xfrm>
           <a:prstGeom prst="rect">
             <a:avLst/>
@@ -8553,14 +8599,14 @@
       </p:pic>
       <p:sp>
         <p:nvSpPr>
-          <p:cNvPr id="185" name="CustomShape 2"/>
+          <p:cNvPr id="186" name="CustomShape 2"/>
           <p:cNvSpPr/>
           <p:nvPr/>
         </p:nvSpPr>
         <p:spPr>
           <a:xfrm>
             <a:off x="359640" y="1485000"/>
-            <a:ext cx="9177840" cy="3508920"/>
+            <a:ext cx="9177480" cy="3508560"/>
           </a:xfrm>
           <a:prstGeom prst="rect">
             <a:avLst/>
@@ -8579,14 +8625,14 @@
       </p:sp>
       <p:sp>
         <p:nvSpPr>
-          <p:cNvPr id="186" name="CustomShape 3"/>
+          <p:cNvPr id="187" name="CustomShape 3"/>
           <p:cNvSpPr/>
           <p:nvPr/>
         </p:nvSpPr>
         <p:spPr>
           <a:xfrm>
             <a:off x="72000" y="3672000"/>
-            <a:ext cx="5112000" cy="3942000"/>
+            <a:ext cx="5111640" cy="3941640"/>
           </a:xfrm>
           <a:prstGeom prst="rect">
             <a:avLst/>
@@ -8607,7 +8653,7 @@
             <a:normAutofit/>
           </a:bodyPr>
           <a:p>
-            <a:pPr marL="432000" indent="-323640">
+            <a:pPr marL="432000" indent="-323280">
               <a:lnSpc>
                 <a:spcPct val="90000"/>
               </a:lnSpc>
@@ -8636,7 +8682,7 @@
             </a:endParaRPr>
           </a:p>
           <a:p>
-            <a:pPr lvl="1" marL="864000" indent="-323640">
+            <a:pPr lvl="1" marL="864000" indent="-323280">
               <a:lnSpc>
                 <a:spcPct val="90000"/>
               </a:lnSpc>
@@ -8665,7 +8711,7 @@
             </a:endParaRPr>
           </a:p>
           <a:p>
-            <a:pPr lvl="1" marL="864000" indent="-323640">
+            <a:pPr lvl="1" marL="864000" indent="-323280">
               <a:lnSpc>
                 <a:spcPct val="90000"/>
               </a:lnSpc>
@@ -8694,7 +8740,7 @@
             </a:endParaRPr>
           </a:p>
           <a:p>
-            <a:pPr lvl="1" marL="864000" indent="-323640">
+            <a:pPr lvl="1" marL="864000" indent="-323280">
               <a:lnSpc>
                 <a:spcPct val="100000"/>
               </a:lnSpc>
@@ -8726,14 +8772,14 @@
       </p:sp>
       <p:sp>
         <p:nvSpPr>
-          <p:cNvPr id="187" name="CustomShape 4"/>
+          <p:cNvPr id="188" name="CustomShape 4"/>
           <p:cNvSpPr/>
           <p:nvPr/>
         </p:nvSpPr>
         <p:spPr>
           <a:xfrm>
             <a:off x="0" y="1080000"/>
-            <a:ext cx="6767640" cy="3167640"/>
+            <a:ext cx="6767280" cy="3167280"/>
           </a:xfrm>
           <a:prstGeom prst="rect">
             <a:avLst/>
@@ -8754,7 +8800,7 @@
             <a:normAutofit/>
           </a:bodyPr>
           <a:p>
-            <a:pPr marL="432000" indent="-323640">
+            <a:pPr marL="432000" indent="-323280">
               <a:lnSpc>
                 <a:spcPct val="90000"/>
               </a:lnSpc>
@@ -8783,7 +8829,7 @@
             </a:endParaRPr>
           </a:p>
           <a:p>
-            <a:pPr marL="432000" indent="-323640">
+            <a:pPr marL="432000" indent="-323280">
               <a:lnSpc>
                 <a:spcPct val="90000"/>
               </a:lnSpc>
@@ -8812,7 +8858,7 @@
             </a:endParaRPr>
           </a:p>
           <a:p>
-            <a:pPr lvl="1" marL="864000" indent="-323640">
+            <a:pPr lvl="1" marL="864000" indent="-323280">
               <a:lnSpc>
                 <a:spcPct val="90000"/>
               </a:lnSpc>
@@ -8841,7 +8887,7 @@
             </a:endParaRPr>
           </a:p>
           <a:p>
-            <a:pPr lvl="1" marL="864000" indent="-323640">
+            <a:pPr lvl="1" marL="864000" indent="-323280">
               <a:lnSpc>
                 <a:spcPct val="90000"/>
               </a:lnSpc>
@@ -8870,7 +8916,7 @@
             </a:endParaRPr>
           </a:p>
           <a:p>
-            <a:pPr lvl="1" marL="864000" indent="-323640">
+            <a:pPr lvl="1" marL="864000" indent="-323280">
               <a:lnSpc>
                 <a:spcPct val="100000"/>
               </a:lnSpc>
@@ -8951,14 +8997,14 @@
       </p:grpSpPr>
       <p:sp>
         <p:nvSpPr>
-          <p:cNvPr id="188" name="CustomShape 1"/>
+          <p:cNvPr id="189" name="CustomShape 1"/>
           <p:cNvSpPr/>
           <p:nvPr/>
         </p:nvSpPr>
         <p:spPr>
           <a:xfrm>
             <a:off x="359640" y="270000"/>
-            <a:ext cx="9357840" cy="673920"/>
+            <a:ext cx="9357480" cy="673560"/>
           </a:xfrm>
           <a:prstGeom prst="rect">
             <a:avLst/>
@@ -9000,14 +9046,14 @@
       </p:sp>
       <p:sp>
         <p:nvSpPr>
-          <p:cNvPr id="189" name="CustomShape 2"/>
+          <p:cNvPr id="190" name="CustomShape 2"/>
           <p:cNvSpPr/>
           <p:nvPr/>
         </p:nvSpPr>
         <p:spPr>
           <a:xfrm>
             <a:off x="359640" y="1485000"/>
-            <a:ext cx="9177840" cy="3508920"/>
+            <a:ext cx="9177480" cy="3508560"/>
           </a:xfrm>
           <a:prstGeom prst="rect">
             <a:avLst/>
@@ -9028,7 +9074,7 @@
             <a:normAutofit/>
           </a:bodyPr>
           <a:p>
-            <a:pPr marL="216000" indent="-216000">
+            <a:pPr marL="216000" indent="-215640">
               <a:lnSpc>
                 <a:spcPct val="100000"/>
               </a:lnSpc>
@@ -9066,7 +9112,7 @@
             </a:endParaRPr>
           </a:p>
           <a:p>
-            <a:pPr marL="216000" indent="-216000">
+            <a:pPr marL="216000" indent="-215640">
               <a:lnSpc>
                 <a:spcPct val="100000"/>
               </a:lnSpc>
@@ -9104,7 +9150,7 @@
             </a:endParaRPr>
           </a:p>
           <a:p>
-            <a:pPr marL="216000" indent="-216000">
+            <a:pPr marL="216000" indent="-215640">
               <a:lnSpc>
                 <a:spcPct val="100000"/>
               </a:lnSpc>
@@ -9142,7 +9188,7 @@
             </a:endParaRPr>
           </a:p>
           <a:p>
-            <a:pPr marL="216000" indent="-216000">
+            <a:pPr marL="216000" indent="-215640">
               <a:lnSpc>
                 <a:spcPct val="100000"/>
               </a:lnSpc>
@@ -9180,7 +9226,7 @@
             </a:endParaRPr>
           </a:p>
           <a:p>
-            <a:pPr marL="216000" indent="-216000">
+            <a:pPr marL="216000" indent="-215640">
               <a:lnSpc>
                 <a:spcPct val="100000"/>
               </a:lnSpc>
@@ -9270,14 +9316,14 @@
       </p:grpSpPr>
       <p:sp>
         <p:nvSpPr>
-          <p:cNvPr id="190" name="CustomShape 1"/>
+          <p:cNvPr id="191" name="CustomShape 1"/>
           <p:cNvSpPr/>
           <p:nvPr/>
         </p:nvSpPr>
         <p:spPr>
           <a:xfrm>
             <a:off x="359640" y="270000"/>
-            <a:ext cx="9357840" cy="673920"/>
+            <a:ext cx="9357480" cy="673560"/>
           </a:xfrm>
           <a:prstGeom prst="rect">
             <a:avLst/>
@@ -9319,14 +9365,14 @@
       </p:sp>
       <p:sp>
         <p:nvSpPr>
-          <p:cNvPr id="191" name="CustomShape 2"/>
+          <p:cNvPr id="192" name="CustomShape 2"/>
           <p:cNvSpPr/>
           <p:nvPr/>
         </p:nvSpPr>
         <p:spPr>
           <a:xfrm>
             <a:off x="359640" y="1485000"/>
-            <a:ext cx="9177840" cy="3508920"/>
+            <a:ext cx="9177480" cy="3508560"/>
           </a:xfrm>
           <a:prstGeom prst="rect">
             <a:avLst/>
@@ -9370,7 +9416,7 @@
             </a:endParaRPr>
           </a:p>
           <a:p>
-            <a:pPr marL="216000" indent="-215640">
+            <a:pPr marL="216000" indent="-215280">
               <a:lnSpc>
                 <a:spcPct val="100000"/>
               </a:lnSpc>
@@ -9399,7 +9445,7 @@
             </a:endParaRPr>
           </a:p>
           <a:p>
-            <a:pPr marL="216000" indent="-215640">
+            <a:pPr marL="216000" indent="-215280">
               <a:lnSpc>
                 <a:spcPct val="100000"/>
               </a:lnSpc>
@@ -9428,7 +9474,7 @@
             </a:endParaRPr>
           </a:p>
           <a:p>
-            <a:pPr marL="216000" indent="-215640">
+            <a:pPr marL="216000" indent="-215280">
               <a:lnSpc>
                 <a:spcPct val="100000"/>
               </a:lnSpc>
@@ -9457,7 +9503,7 @@
             </a:endParaRPr>
           </a:p>
           <a:p>
-            <a:pPr marL="216000" indent="-215640">
+            <a:pPr marL="216000" indent="-215280">
               <a:lnSpc>
                 <a:spcPct val="100000"/>
               </a:lnSpc>
@@ -9486,7 +9532,7 @@
             </a:endParaRPr>
           </a:p>
           <a:p>
-            <a:pPr marL="216000" indent="-215640">
+            <a:pPr marL="216000" indent="-215280">
               <a:lnSpc>
                 <a:spcPct val="100000"/>
               </a:lnSpc>
@@ -9567,14 +9613,14 @@
       </p:grpSpPr>
       <p:sp>
         <p:nvSpPr>
-          <p:cNvPr id="192" name="CustomShape 1"/>
+          <p:cNvPr id="193" name="CustomShape 1"/>
           <p:cNvSpPr/>
           <p:nvPr/>
         </p:nvSpPr>
         <p:spPr>
           <a:xfrm>
             <a:off x="359640" y="270000"/>
-            <a:ext cx="9357840" cy="673920"/>
+            <a:ext cx="9357480" cy="673560"/>
           </a:xfrm>
           <a:prstGeom prst="rect">
             <a:avLst/>
@@ -9616,14 +9662,14 @@
       </p:sp>
       <p:sp>
         <p:nvSpPr>
-          <p:cNvPr id="193" name="CustomShape 2"/>
+          <p:cNvPr id="194" name="CustomShape 2"/>
           <p:cNvSpPr/>
           <p:nvPr/>
         </p:nvSpPr>
         <p:spPr>
           <a:xfrm>
             <a:off x="359640" y="1782000"/>
-            <a:ext cx="9177840" cy="2617920"/>
+            <a:ext cx="9177480" cy="2617560"/>
           </a:xfrm>
           <a:prstGeom prst="rect">
             <a:avLst/>
@@ -9644,7 +9690,7 @@
             <a:normAutofit/>
           </a:bodyPr>
           <a:p>
-            <a:pPr marL="216000" indent="-214560">
+            <a:pPr marL="216000" indent="-214200">
               <a:lnSpc>
                 <a:spcPct val="100000"/>
               </a:lnSpc>
@@ -9673,7 +9719,7 @@
             </a:endParaRPr>
           </a:p>
           <a:p>
-            <a:pPr marL="216000" indent="-214560">
+            <a:pPr marL="216000" indent="-214200">
               <a:lnSpc>
                 <a:spcPct val="100000"/>
               </a:lnSpc>
@@ -9702,7 +9748,7 @@
             </a:endParaRPr>
           </a:p>
           <a:p>
-            <a:pPr marL="216000" indent="-214560">
+            <a:pPr marL="216000" indent="-214200">
               <a:lnSpc>
                 <a:spcPct val="100000"/>
               </a:lnSpc>
@@ -9731,7 +9777,7 @@
             </a:endParaRPr>
           </a:p>
           <a:p>
-            <a:pPr marL="216000" indent="-214560">
+            <a:pPr marL="216000" indent="-214200">
               <a:lnSpc>
                 <a:spcPct val="100000"/>
               </a:lnSpc>
@@ -9760,7 +9806,7 @@
             </a:endParaRPr>
           </a:p>
           <a:p>
-            <a:pPr marL="216000" indent="-214560">
+            <a:pPr marL="216000" indent="-214200">
               <a:lnSpc>
                 <a:spcPct val="100000"/>
               </a:lnSpc>
@@ -9789,7 +9835,7 @@
             </a:endParaRPr>
           </a:p>
           <a:p>
-            <a:pPr marL="216000" indent="-214560">
+            <a:pPr marL="216000" indent="-214200">
               <a:lnSpc>
                 <a:spcPct val="100000"/>
               </a:lnSpc>

</xml_diff>